<commit_message>
material clase 6 y 7 actualizado
</commit_message>
<xml_diff>
--- a/clase_7/teoria/clase_7.E3.pptx
+++ b/clase_7/teoria/clase_7.E3.pptx
@@ -137,13 +137,52 @@
 <file path=ppt/revisionInfo.xml><?xml version="1.0" encoding="utf-8"?>
 <p1510:revInfo xmlns:a="http://schemas.openxmlformats.org/drawingml/2006/main" xmlns:r="http://schemas.openxmlformats.org/officeDocument/2006/relationships" xmlns:p1510="http://schemas.microsoft.com/office/powerpoint/2015/10/main">
   <p1510:revLst>
-    <p1510:client id="{7DEFC35E-7A36-4365-B2E9-B48337AC78C0}" v="3" dt="2023-04-14T16:06:24.615"/>
+    <p1510:client id="{A4BF7384-52E3-48FF-9C76-BB70B93E1201}" v="6" dt="2023-10-06T21:15:17.031"/>
   </p1510:revLst>
 </p1510:revInfo>
 </file>
 
 <file path=ppt/changesInfos/changesInfo1.xml><?xml version="1.0" encoding="utf-8"?>
 <pc:chgInfo xmlns:a="http://schemas.openxmlformats.org/drawingml/2006/main" xmlns:r="http://schemas.openxmlformats.org/officeDocument/2006/relationships" xmlns:ac="http://schemas.microsoft.com/office/drawing/2013/main/command" xmlns:pc="http://schemas.microsoft.com/office/powerpoint/2013/main/command">
+  <pc:docChgLst>
+    <pc:chgData name="Marcos Maillot" userId="fa14b39d-e966-4ebb-a436-4f96f84b9577" providerId="ADAL" clId="{A4BF7384-52E3-48FF-9C76-BB70B93E1201}"/>
+    <pc:docChg chg="modSld">
+      <pc:chgData name="Marcos Maillot" userId="fa14b39d-e966-4ebb-a436-4f96f84b9577" providerId="ADAL" clId="{A4BF7384-52E3-48FF-9C76-BB70B93E1201}" dt="2023-10-06T21:15:17.030" v="44" actId="1076"/>
+      <pc:docMkLst>
+        <pc:docMk/>
+      </pc:docMkLst>
+      <pc:sldChg chg="addSp modSp mod">
+        <pc:chgData name="Marcos Maillot" userId="fa14b39d-e966-4ebb-a436-4f96f84b9577" providerId="ADAL" clId="{A4BF7384-52E3-48FF-9C76-BB70B93E1201}" dt="2023-10-06T21:15:17.030" v="44" actId="1076"/>
+        <pc:sldMkLst>
+          <pc:docMk/>
+          <pc:sldMk cId="1908477380" sldId="341"/>
+        </pc:sldMkLst>
+        <pc:spChg chg="add mod">
+          <ac:chgData name="Marcos Maillot" userId="fa14b39d-e966-4ebb-a436-4f96f84b9577" providerId="ADAL" clId="{A4BF7384-52E3-48FF-9C76-BB70B93E1201}" dt="2023-10-06T21:15:17.030" v="44" actId="1076"/>
+          <ac:spMkLst>
+            <pc:docMk/>
+            <pc:sldMk cId="1908477380" sldId="341"/>
+            <ac:spMk id="2" creationId="{57919B4D-0915-DACE-CE26-EF6538DDE023}"/>
+          </ac:spMkLst>
+        </pc:spChg>
+      </pc:sldChg>
+      <pc:sldChg chg="modSp mod">
+        <pc:chgData name="Marcos Maillot" userId="fa14b39d-e966-4ebb-a436-4f96f84b9577" providerId="ADAL" clId="{A4BF7384-52E3-48FF-9C76-BB70B93E1201}" dt="2023-10-02T20:47:52.373" v="0" actId="1076"/>
+        <pc:sldMkLst>
+          <pc:docMk/>
+          <pc:sldMk cId="3391204457" sldId="371"/>
+        </pc:sldMkLst>
+        <pc:spChg chg="mod">
+          <ac:chgData name="Marcos Maillot" userId="fa14b39d-e966-4ebb-a436-4f96f84b9577" providerId="ADAL" clId="{A4BF7384-52E3-48FF-9C76-BB70B93E1201}" dt="2023-10-02T20:47:52.373" v="0" actId="1076"/>
+          <ac:spMkLst>
+            <pc:docMk/>
+            <pc:sldMk cId="3391204457" sldId="371"/>
+            <ac:spMk id="7" creationId="{17B107EE-A416-AA0A-140E-B3A6C8C6B758}"/>
+          </ac:spMkLst>
+        </pc:spChg>
+      </pc:sldChg>
+    </pc:docChg>
+  </pc:docChgLst>
   <pc:docChgLst>
     <pc:chgData name="Marcos Maillot" userId="fa14b39d-e966-4ebb-a436-4f96f84b9577" providerId="ADAL" clId="{FB871206-FCF4-4FA8-A2BD-A0BA716C9726}"/>
     <pc:docChg chg="custSel modSld">
@@ -5198,7 +5237,7 @@
           <a:p>
             <a:fld id="{849DE176-146E-4F1E-BCCE-E46272DCA095}" type="datetimeFigureOut">
               <a:rPr lang="es-AR" smtClean="0"/>
-              <a:t>14/4/2023</a:t>
+              <a:t>6/10/2023</a:t>
             </a:fld>
             <a:endParaRPr lang="es-AR"/>
           </a:p>
@@ -5465,7 +5504,7 @@
           <a:p>
             <a:fld id="{849DE176-146E-4F1E-BCCE-E46272DCA095}" type="datetimeFigureOut">
               <a:rPr lang="es-AR" smtClean="0"/>
-              <a:t>14/4/2023</a:t>
+              <a:t>6/10/2023</a:t>
             </a:fld>
             <a:endParaRPr lang="es-AR"/>
           </a:p>
@@ -5661,7 +5700,7 @@
           <a:p>
             <a:fld id="{849DE176-146E-4F1E-BCCE-E46272DCA095}" type="datetimeFigureOut">
               <a:rPr lang="es-AR" smtClean="0"/>
-              <a:t>14/4/2023</a:t>
+              <a:t>6/10/2023</a:t>
             </a:fld>
             <a:endParaRPr lang="es-AR"/>
           </a:p>
@@ -5924,7 +5963,7 @@
           <a:p>
             <a:fld id="{849DE176-146E-4F1E-BCCE-E46272DCA095}" type="datetimeFigureOut">
               <a:rPr lang="es-AR" smtClean="0"/>
-              <a:t>14/4/2023</a:t>
+              <a:t>6/10/2023</a:t>
             </a:fld>
             <a:endParaRPr lang="es-AR"/>
           </a:p>
@@ -6358,7 +6397,7 @@
           <a:p>
             <a:fld id="{849DE176-146E-4F1E-BCCE-E46272DCA095}" type="datetimeFigureOut">
               <a:rPr lang="es-AR" smtClean="0"/>
-              <a:t>14/4/2023</a:t>
+              <a:t>6/10/2023</a:t>
             </a:fld>
             <a:endParaRPr lang="es-AR"/>
           </a:p>
@@ -6904,7 +6943,7 @@
           <a:p>
             <a:fld id="{849DE176-146E-4F1E-BCCE-E46272DCA095}" type="datetimeFigureOut">
               <a:rPr lang="es-AR" smtClean="0"/>
-              <a:t>14/4/2023</a:t>
+              <a:t>6/10/2023</a:t>
             </a:fld>
             <a:endParaRPr lang="es-AR"/>
           </a:p>
@@ -7624,7 +7663,7 @@
           <a:p>
             <a:fld id="{849DE176-146E-4F1E-BCCE-E46272DCA095}" type="datetimeFigureOut">
               <a:rPr lang="es-AR" smtClean="0"/>
-              <a:t>14/4/2023</a:t>
+              <a:t>6/10/2023</a:t>
             </a:fld>
             <a:endParaRPr lang="es-AR"/>
           </a:p>
@@ -7794,7 +7833,7 @@
           <a:p>
             <a:fld id="{849DE176-146E-4F1E-BCCE-E46272DCA095}" type="datetimeFigureOut">
               <a:rPr lang="es-AR" smtClean="0"/>
-              <a:t>14/4/2023</a:t>
+              <a:t>6/10/2023</a:t>
             </a:fld>
             <a:endParaRPr lang="es-AR"/>
           </a:p>
@@ -7974,7 +8013,7 @@
           <a:p>
             <a:fld id="{849DE176-146E-4F1E-BCCE-E46272DCA095}" type="datetimeFigureOut">
               <a:rPr lang="es-AR" smtClean="0"/>
-              <a:t>14/4/2023</a:t>
+              <a:t>6/10/2023</a:t>
             </a:fld>
             <a:endParaRPr lang="es-AR"/>
           </a:p>
@@ -8144,7 +8183,7 @@
           <a:p>
             <a:fld id="{849DE176-146E-4F1E-BCCE-E46272DCA095}" type="datetimeFigureOut">
               <a:rPr lang="es-AR" smtClean="0"/>
-              <a:t>14/4/2023</a:t>
+              <a:t>6/10/2023</a:t>
             </a:fld>
             <a:endParaRPr lang="es-AR"/>
           </a:p>
@@ -8394,7 +8433,7 @@
           <a:p>
             <a:fld id="{849DE176-146E-4F1E-BCCE-E46272DCA095}" type="datetimeFigureOut">
               <a:rPr lang="es-AR" smtClean="0"/>
-              <a:t>14/4/2023</a:t>
+              <a:t>6/10/2023</a:t>
             </a:fld>
             <a:endParaRPr lang="es-AR"/>
           </a:p>
@@ -8626,7 +8665,7 @@
           <a:p>
             <a:fld id="{849DE176-146E-4F1E-BCCE-E46272DCA095}" type="datetimeFigureOut">
               <a:rPr lang="es-AR" smtClean="0"/>
-              <a:t>14/4/2023</a:t>
+              <a:t>6/10/2023</a:t>
             </a:fld>
             <a:endParaRPr lang="es-AR"/>
           </a:p>
@@ -9007,7 +9046,7 @@
           <a:p>
             <a:fld id="{849DE176-146E-4F1E-BCCE-E46272DCA095}" type="datetimeFigureOut">
               <a:rPr lang="es-AR" smtClean="0"/>
-              <a:t>14/4/2023</a:t>
+              <a:t>6/10/2023</a:t>
             </a:fld>
             <a:endParaRPr lang="es-AR"/>
           </a:p>
@@ -9125,7 +9164,7 @@
           <a:p>
             <a:fld id="{849DE176-146E-4F1E-BCCE-E46272DCA095}" type="datetimeFigureOut">
               <a:rPr lang="es-AR" smtClean="0"/>
-              <a:t>14/4/2023</a:t>
+              <a:t>6/10/2023</a:t>
             </a:fld>
             <a:endParaRPr lang="es-AR"/>
           </a:p>
@@ -9220,7 +9259,7 @@
           <a:p>
             <a:fld id="{849DE176-146E-4F1E-BCCE-E46272DCA095}" type="datetimeFigureOut">
               <a:rPr lang="es-AR" smtClean="0"/>
-              <a:t>14/4/2023</a:t>
+              <a:t>6/10/2023</a:t>
             </a:fld>
             <a:endParaRPr lang="es-AR"/>
           </a:p>
@@ -9469,7 +9508,7 @@
           <a:p>
             <a:fld id="{849DE176-146E-4F1E-BCCE-E46272DCA095}" type="datetimeFigureOut">
               <a:rPr lang="es-AR" smtClean="0"/>
-              <a:t>14/4/2023</a:t>
+              <a:t>6/10/2023</a:t>
             </a:fld>
             <a:endParaRPr lang="es-AR"/>
           </a:p>
@@ -9749,7 +9788,7 @@
           <a:p>
             <a:fld id="{849DE176-146E-4F1E-BCCE-E46272DCA095}" type="datetimeFigureOut">
               <a:rPr lang="es-AR" smtClean="0"/>
-              <a:t>14/4/2023</a:t>
+              <a:t>6/10/2023</a:t>
             </a:fld>
             <a:endParaRPr lang="es-AR"/>
           </a:p>
@@ -12850,7 +12889,7 @@
           <a:p>
             <a:fld id="{849DE176-146E-4F1E-BCCE-E46272DCA095}" type="datetimeFigureOut">
               <a:rPr lang="es-AR" smtClean="0"/>
-              <a:t>14/4/2023</a:t>
+              <a:t>6/10/2023</a:t>
             </a:fld>
             <a:endParaRPr lang="es-AR"/>
           </a:p>
@@ -26250,6 +26289,100 @@
           </a:p>
         </p:txBody>
       </p:sp>
+      <p:sp>
+        <p:nvSpPr>
+          <p:cNvPr id="2" name="Rectangle 1">
+            <a:extLst>
+              <a:ext uri="{FF2B5EF4-FFF2-40B4-BE49-F238E27FC236}">
+                <a16:creationId xmlns:a16="http://schemas.microsoft.com/office/drawing/2014/main" id="{57919B4D-0915-DACE-CE26-EF6538DDE023}"/>
+              </a:ext>
+            </a:extLst>
+          </p:cNvPr>
+          <p:cNvSpPr>
+            <a:spLocks noChangeArrowheads="1"/>
+          </p:cNvSpPr>
+          <p:nvPr/>
+        </p:nvSpPr>
+        <p:spPr bwMode="auto">
+          <a:xfrm>
+            <a:off x="7728573" y="1888849"/>
+            <a:ext cx="2845248" cy="461665"/>
+          </a:xfrm>
+          <a:prstGeom prst="rect">
+            <a:avLst/>
+          </a:prstGeom>
+          <a:noFill/>
+          <a:ln>
+            <a:noFill/>
+          </a:ln>
+          <a:effectLst/>
+          <a:extLst>
+            <a:ext uri="{909E8E84-426E-40DD-AFC4-6F175D3DCCD1}">
+              <a14:hiddenFill xmlns:a14="http://schemas.microsoft.com/office/drawing/2010/main">
+                <a:solidFill>
+                  <a:schemeClr val="accent1"/>
+                </a:solidFill>
+              </a14:hiddenFill>
+            </a:ext>
+            <a:ext uri="{91240B29-F687-4F45-9708-019B960494DF}">
+              <a14:hiddenLine xmlns:a14="http://schemas.microsoft.com/office/drawing/2010/main" w="9525">
+                <a:solidFill>
+                  <a:schemeClr val="tx1"/>
+                </a:solidFill>
+                <a:miter lim="800000"/>
+                <a:headEnd/>
+                <a:tailEnd/>
+              </a14:hiddenLine>
+            </a:ext>
+            <a:ext uri="{AF507438-7753-43E0-B8FC-AC1667EBCBE1}">
+              <a14:hiddenEffects xmlns:a14="http://schemas.microsoft.com/office/drawing/2010/main">
+                <a:effectLst>
+                  <a:outerShdw dist="35921" dir="2700000" algn="ctr" rotWithShape="0">
+                    <a:schemeClr val="bg2"/>
+                  </a:outerShdw>
+                </a:effectLst>
+              </a14:hiddenEffects>
+            </a:ext>
+          </a:extLst>
+        </p:spPr>
+        <p:txBody>
+          <a:bodyPr vert="horz" wrap="square" lIns="91440" tIns="45720" rIns="91440" bIns="45720" numCol="1" anchor="ctr" anchorCtr="0" compatLnSpc="1">
+            <a:prstTxWarp prst="textNoShape">
+              <a:avLst/>
+            </a:prstTxWarp>
+            <a:spAutoFit/>
+          </a:bodyPr>
+          <a:lstStyle/>
+          <a:p>
+            <a:pPr marL="0" lvl="6" fontAlgn="base">
+              <a:spcBef>
+                <a:spcPct val="0"/>
+              </a:spcBef>
+              <a:spcAft>
+                <a:spcPct val="0"/>
+              </a:spcAft>
+            </a:pPr>
+            <a:r>
+              <a:rPr lang="es-AR" sz="2400" b="1" dirty="0">
+                <a:solidFill>
+                  <a:schemeClr val="bg1"/>
+                </a:solidFill>
+              </a:rPr>
+              <a:t>Regularización L1</a:t>
+            </a:r>
+            <a:endParaRPr kumimoji="0" lang="es-AR" sz="2400" b="0" i="0" u="none" strike="noStrike" cap="none" normalizeH="0" baseline="0" dirty="0">
+              <a:ln>
+                <a:noFill/>
+              </a:ln>
+              <a:solidFill>
+                <a:schemeClr val="bg1"/>
+              </a:solidFill>
+              <a:effectLst/>
+              <a:latin typeface="Arial" panose="020B0604020202020204" pitchFamily="34" charset="0"/>
+            </a:endParaRPr>
+          </a:p>
+        </p:txBody>
+      </p:sp>
     </p:spTree>
     <p:extLst>
       <p:ext uri="{BB962C8B-B14F-4D97-AF65-F5344CB8AC3E}">
@@ -30812,7 +30945,7 @@
         </p:nvSpPr>
         <p:spPr>
           <a:xfrm>
-            <a:off x="340920" y="6300763"/>
+            <a:off x="291919" y="6300763"/>
             <a:ext cx="7628192" cy="369332"/>
           </a:xfrm>
           <a:prstGeom prst="rect">

</xml_diff>

<commit_message>
material clase 7 y 8 actualizado
</commit_message>
<xml_diff>
--- a/clase_7/teoria/clase_7.E3.pptx
+++ b/clase_7/teoria/clase_7.E3.pptx
@@ -220,6 +220,30 @@
             <ac:picMk id="9" creationId="{00000000-0000-0000-0000-000000000000}"/>
           </ac:picMkLst>
         </pc:picChg>
+      </pc:sldChg>
+    </pc:docChg>
+  </pc:docChgLst>
+  <pc:docChgLst>
+    <pc:chgData name="Marcos Maillot" userId="fa14b39d-e966-4ebb-a436-4f96f84b9577" providerId="ADAL" clId="{4FE6267F-F22B-4A4B-9239-01F6B50ED556}"/>
+    <pc:docChg chg="custSel modSld">
+      <pc:chgData name="Marcos Maillot" userId="fa14b39d-e966-4ebb-a436-4f96f84b9577" providerId="ADAL" clId="{4FE6267F-F22B-4A4B-9239-01F6B50ED556}" dt="2024-04-20T14:11:37.026" v="0" actId="478"/>
+      <pc:docMkLst>
+        <pc:docMk/>
+      </pc:docMkLst>
+      <pc:sldChg chg="delSp mod">
+        <pc:chgData name="Marcos Maillot" userId="fa14b39d-e966-4ebb-a436-4f96f84b9577" providerId="ADAL" clId="{4FE6267F-F22B-4A4B-9239-01F6B50ED556}" dt="2024-04-20T14:11:37.026" v="0" actId="478"/>
+        <pc:sldMkLst>
+          <pc:docMk/>
+          <pc:sldMk cId="787285808" sldId="256"/>
+        </pc:sldMkLst>
+        <pc:spChg chg="del">
+          <ac:chgData name="Marcos Maillot" userId="fa14b39d-e966-4ebb-a436-4f96f84b9577" providerId="ADAL" clId="{4FE6267F-F22B-4A4B-9239-01F6B50ED556}" dt="2024-04-20T14:11:37.026" v="0" actId="478"/>
+          <ac:spMkLst>
+            <pc:docMk/>
+            <pc:sldMk cId="787285808" sldId="256"/>
+            <ac:spMk id="6" creationId="{00000000-0000-0000-0000-000000000000}"/>
+          </ac:spMkLst>
+        </pc:spChg>
       </pc:sldChg>
     </pc:docChg>
   </pc:docChgLst>
@@ -1050,7 +1074,7 @@
           <a:noFill/>
           <a:extLst>
             <a:ext uri="{909E8E84-426E-40dd-AFC4-6F175D3DCCD1}">
-              <a14:hiddenFill xmlns:a14="http://schemas.microsoft.com/office/drawing/2010/main" xmlns="">
+              <a14:hiddenFill xmlns="" xmlns:a14="http://schemas.microsoft.com/office/drawing/2010/main">
                 <a:solidFill>
                   <a:srgbClr val="FFFFFF"/>
                 </a:solidFill>
@@ -1110,7 +1134,7 @@
             </a:ln>
             <a:extLst>
               <a:ext uri="{91240B29-F687-4f45-9708-019B960494DF}">
-                <a14:hiddenLine xmlns:a14="http://schemas.microsoft.com/office/drawing/2010/main" xmlns="" w="9525">
+                <a14:hiddenLine xmlns="" xmlns:a14="http://schemas.microsoft.com/office/drawing/2010/main" w="9525">
                   <a:solidFill>
                     <a:srgbClr val="000000"/>
                   </a:solidFill>
@@ -1200,7 +1224,7 @@
             </a:ln>
             <a:extLst>
               <a:ext uri="{91240B29-F687-4f45-9708-019B960494DF}">
-                <a14:hiddenLine xmlns:a14="http://schemas.microsoft.com/office/drawing/2010/main" xmlns="" w="9525">
+                <a14:hiddenLine xmlns="" xmlns:a14="http://schemas.microsoft.com/office/drawing/2010/main" w="9525">
                   <a:solidFill>
                     <a:srgbClr val="000000"/>
                   </a:solidFill>
@@ -1290,7 +1314,7 @@
             </a:ln>
             <a:extLst>
               <a:ext uri="{91240B29-F687-4f45-9708-019B960494DF}">
-                <a14:hiddenLine xmlns:a14="http://schemas.microsoft.com/office/drawing/2010/main" xmlns="" w="9525">
+                <a14:hiddenLine xmlns="" xmlns:a14="http://schemas.microsoft.com/office/drawing/2010/main" w="9525">
                   <a:solidFill>
                     <a:srgbClr val="000000"/>
                   </a:solidFill>
@@ -1324,7 +1348,7 @@
             </a:ln>
             <a:extLst>
               <a:ext uri="{91240B29-F687-4f45-9708-019B960494DF}">
-                <a14:hiddenLine xmlns:a14="http://schemas.microsoft.com/office/drawing/2010/main" xmlns="" w="9525">
+                <a14:hiddenLine xmlns="" xmlns:a14="http://schemas.microsoft.com/office/drawing/2010/main" w="9525">
                   <a:solidFill>
                     <a:srgbClr val="000000"/>
                   </a:solidFill>
@@ -1414,7 +1438,7 @@
             </a:ln>
             <a:extLst>
               <a:ext uri="{91240B29-F687-4f45-9708-019B960494DF}">
-                <a14:hiddenLine xmlns:a14="http://schemas.microsoft.com/office/drawing/2010/main" xmlns="" w="9525">
+                <a14:hiddenLine xmlns="" xmlns:a14="http://schemas.microsoft.com/office/drawing/2010/main" w="9525">
                   <a:solidFill>
                     <a:srgbClr val="000000"/>
                   </a:solidFill>
@@ -1476,7 +1500,7 @@
             </a:ln>
             <a:extLst>
               <a:ext uri="{91240B29-F687-4f45-9708-019B960494DF}">
-                <a14:hiddenLine xmlns:a14="http://schemas.microsoft.com/office/drawing/2010/main" xmlns="" w="9525">
+                <a14:hiddenLine xmlns="" xmlns:a14="http://schemas.microsoft.com/office/drawing/2010/main" w="9525">
                   <a:solidFill>
                     <a:srgbClr val="000000"/>
                   </a:solidFill>
@@ -1538,7 +1562,7 @@
             </a:ln>
             <a:extLst>
               <a:ext uri="{91240B29-F687-4f45-9708-019B960494DF}">
-                <a14:hiddenLine xmlns:a14="http://schemas.microsoft.com/office/drawing/2010/main" xmlns="" w="9525">
+                <a14:hiddenLine xmlns="" xmlns:a14="http://schemas.microsoft.com/office/drawing/2010/main" w="9525">
                   <a:solidFill>
                     <a:srgbClr val="000000"/>
                   </a:solidFill>
@@ -1628,7 +1652,7 @@
             </a:ln>
             <a:extLst>
               <a:ext uri="{91240B29-F687-4f45-9708-019B960494DF}">
-                <a14:hiddenLine xmlns:a14="http://schemas.microsoft.com/office/drawing/2010/main" xmlns="" w="9525">
+                <a14:hiddenLine xmlns="" xmlns:a14="http://schemas.microsoft.com/office/drawing/2010/main" w="9525">
                   <a:solidFill>
                     <a:srgbClr val="000000"/>
                   </a:solidFill>
@@ -1690,7 +1714,7 @@
             </a:ln>
             <a:extLst>
               <a:ext uri="{91240B29-F687-4f45-9708-019B960494DF}">
-                <a14:hiddenLine xmlns:a14="http://schemas.microsoft.com/office/drawing/2010/main" xmlns="" w="9525">
+                <a14:hiddenLine xmlns="" xmlns:a14="http://schemas.microsoft.com/office/drawing/2010/main" w="9525">
                   <a:solidFill>
                     <a:srgbClr val="000000"/>
                   </a:solidFill>
@@ -1752,7 +1776,7 @@
             </a:ln>
             <a:extLst>
               <a:ext uri="{91240B29-F687-4f45-9708-019B960494DF}">
-                <a14:hiddenLine xmlns:a14="http://schemas.microsoft.com/office/drawing/2010/main" xmlns="" w="9525">
+                <a14:hiddenLine xmlns="" xmlns:a14="http://schemas.microsoft.com/office/drawing/2010/main" w="9525">
                   <a:solidFill>
                     <a:srgbClr val="000000"/>
                   </a:solidFill>
@@ -1842,7 +1866,7 @@
             </a:ln>
             <a:extLst>
               <a:ext uri="{91240B29-F687-4f45-9708-019B960494DF}">
-                <a14:hiddenLine xmlns:a14="http://schemas.microsoft.com/office/drawing/2010/main" xmlns="" w="9525">
+                <a14:hiddenLine xmlns="" xmlns:a14="http://schemas.microsoft.com/office/drawing/2010/main" w="9525">
                   <a:solidFill>
                     <a:srgbClr val="000000"/>
                   </a:solidFill>
@@ -1932,7 +1956,7 @@
             </a:ln>
             <a:extLst>
               <a:ext uri="{91240B29-F687-4f45-9708-019B960494DF}">
-                <a14:hiddenLine xmlns:a14="http://schemas.microsoft.com/office/drawing/2010/main" xmlns="" w="9525">
+                <a14:hiddenLine xmlns="" xmlns:a14="http://schemas.microsoft.com/office/drawing/2010/main" w="9525">
                   <a:solidFill>
                     <a:srgbClr val="000000"/>
                   </a:solidFill>
@@ -1994,7 +2018,7 @@
             </a:ln>
             <a:extLst>
               <a:ext uri="{91240B29-F687-4f45-9708-019B960494DF}">
-                <a14:hiddenLine xmlns:a14="http://schemas.microsoft.com/office/drawing/2010/main" xmlns="" w="9525">
+                <a14:hiddenLine xmlns="" xmlns:a14="http://schemas.microsoft.com/office/drawing/2010/main" w="9525">
                   <a:solidFill>
                     <a:srgbClr val="000000"/>
                   </a:solidFill>
@@ -2104,7 +2128,7 @@
             </a:ln>
             <a:extLst>
               <a:ext uri="{91240B29-F687-4f45-9708-019B960494DF}">
-                <a14:hiddenLine xmlns:a14="http://schemas.microsoft.com/office/drawing/2010/main" xmlns="" w="9525">
+                <a14:hiddenLine xmlns="" xmlns:a14="http://schemas.microsoft.com/office/drawing/2010/main" w="9525">
                   <a:solidFill>
                     <a:srgbClr val="000000"/>
                   </a:solidFill>
@@ -2166,7 +2190,7 @@
             </a:ln>
             <a:extLst>
               <a:ext uri="{91240B29-F687-4f45-9708-019B960494DF}">
-                <a14:hiddenLine xmlns:a14="http://schemas.microsoft.com/office/drawing/2010/main" xmlns="" w="9525">
+                <a14:hiddenLine xmlns="" xmlns:a14="http://schemas.microsoft.com/office/drawing/2010/main" w="9525">
                   <a:solidFill>
                     <a:srgbClr val="000000"/>
                   </a:solidFill>
@@ -2256,7 +2280,7 @@
             </a:ln>
             <a:extLst>
               <a:ext uri="{91240B29-F687-4f45-9708-019B960494DF}">
-                <a14:hiddenLine xmlns:a14="http://schemas.microsoft.com/office/drawing/2010/main" xmlns="" w="9525">
+                <a14:hiddenLine xmlns="" xmlns:a14="http://schemas.microsoft.com/office/drawing/2010/main" w="9525">
                   <a:solidFill>
                     <a:srgbClr val="000000"/>
                   </a:solidFill>
@@ -2346,7 +2370,7 @@
             </a:ln>
             <a:extLst>
               <a:ext uri="{91240B29-F687-4f45-9708-019B960494DF}">
-                <a14:hiddenLine xmlns:a14="http://schemas.microsoft.com/office/drawing/2010/main" xmlns="" w="9525">
+                <a14:hiddenLine xmlns="" xmlns:a14="http://schemas.microsoft.com/office/drawing/2010/main" w="9525">
                   <a:solidFill>
                     <a:srgbClr val="000000"/>
                   </a:solidFill>
@@ -2408,7 +2432,7 @@
             </a:ln>
             <a:extLst>
               <a:ext uri="{91240B29-F687-4f45-9708-019B960494DF}">
-                <a14:hiddenLine xmlns:a14="http://schemas.microsoft.com/office/drawing/2010/main" xmlns="" w="9525">
+                <a14:hiddenLine xmlns="" xmlns:a14="http://schemas.microsoft.com/office/drawing/2010/main" w="9525">
                   <a:solidFill>
                     <a:srgbClr val="000000"/>
                   </a:solidFill>
@@ -2498,7 +2522,7 @@
             </a:ln>
             <a:extLst>
               <a:ext uri="{91240B29-F687-4f45-9708-019B960494DF}">
-                <a14:hiddenLine xmlns:a14="http://schemas.microsoft.com/office/drawing/2010/main" xmlns="" w="9525">
+                <a14:hiddenLine xmlns="" xmlns:a14="http://schemas.microsoft.com/office/drawing/2010/main" w="9525">
                   <a:solidFill>
                     <a:srgbClr val="000000"/>
                   </a:solidFill>
@@ -2588,7 +2612,7 @@
             </a:ln>
             <a:extLst>
               <a:ext uri="{91240B29-F687-4f45-9708-019B960494DF}">
-                <a14:hiddenLine xmlns:a14="http://schemas.microsoft.com/office/drawing/2010/main" xmlns="" w="9525">
+                <a14:hiddenLine xmlns="" xmlns:a14="http://schemas.microsoft.com/office/drawing/2010/main" w="9525">
                   <a:solidFill>
                     <a:srgbClr val="000000"/>
                   </a:solidFill>
@@ -2644,7 +2668,7 @@
             </a:ln>
             <a:extLst>
               <a:ext uri="{91240B29-F687-4f45-9708-019B960494DF}">
-                <a14:hiddenLine xmlns:a14="http://schemas.microsoft.com/office/drawing/2010/main" xmlns="" w="9525">
+                <a14:hiddenLine xmlns="" xmlns:a14="http://schemas.microsoft.com/office/drawing/2010/main" w="9525">
                   <a:solidFill>
                     <a:srgbClr val="000000"/>
                   </a:solidFill>
@@ -2734,7 +2758,7 @@
             </a:ln>
             <a:extLst>
               <a:ext uri="{91240B29-F687-4f45-9708-019B960494DF}">
-                <a14:hiddenLine xmlns:a14="http://schemas.microsoft.com/office/drawing/2010/main" xmlns="" w="9525">
+                <a14:hiddenLine xmlns="" xmlns:a14="http://schemas.microsoft.com/office/drawing/2010/main" w="9525">
                   <a:solidFill>
                     <a:srgbClr val="000000"/>
                   </a:solidFill>
@@ -2790,7 +2814,7 @@
             </a:ln>
             <a:extLst>
               <a:ext uri="{91240B29-F687-4f45-9708-019B960494DF}">
-                <a14:hiddenLine xmlns:a14="http://schemas.microsoft.com/office/drawing/2010/main" xmlns="" w="9525">
+                <a14:hiddenLine xmlns="" xmlns:a14="http://schemas.microsoft.com/office/drawing/2010/main" w="9525">
                   <a:solidFill>
                     <a:srgbClr val="000000"/>
                   </a:solidFill>
@@ -2880,7 +2904,7 @@
             </a:ln>
             <a:extLst>
               <a:ext uri="{91240B29-F687-4f45-9708-019B960494DF}">
-                <a14:hiddenLine xmlns:a14="http://schemas.microsoft.com/office/drawing/2010/main" xmlns="" w="9525">
+                <a14:hiddenLine xmlns="" xmlns:a14="http://schemas.microsoft.com/office/drawing/2010/main" w="9525">
                   <a:solidFill>
                     <a:srgbClr val="000000"/>
                   </a:solidFill>
@@ -2948,7 +2972,7 @@
             </a:ln>
             <a:extLst>
               <a:ext uri="{91240B29-F687-4f45-9708-019B960494DF}">
-                <a14:hiddenLine xmlns:a14="http://schemas.microsoft.com/office/drawing/2010/main" xmlns="" w="9525">
+                <a14:hiddenLine xmlns="" xmlns:a14="http://schemas.microsoft.com/office/drawing/2010/main" w="9525">
                   <a:solidFill>
                     <a:srgbClr val="000000"/>
                   </a:solidFill>
@@ -3038,7 +3062,7 @@
             </a:ln>
             <a:extLst>
               <a:ext uri="{91240B29-F687-4f45-9708-019B960494DF}">
-                <a14:hiddenLine xmlns:a14="http://schemas.microsoft.com/office/drawing/2010/main" xmlns="" w="9525">
+                <a14:hiddenLine xmlns="" xmlns:a14="http://schemas.microsoft.com/office/drawing/2010/main" w="9525">
                   <a:solidFill>
                     <a:srgbClr val="000000"/>
                   </a:solidFill>
@@ -3106,7 +3130,7 @@
             </a:ln>
             <a:extLst>
               <a:ext uri="{91240B29-F687-4f45-9708-019B960494DF}">
-                <a14:hiddenLine xmlns:a14="http://schemas.microsoft.com/office/drawing/2010/main" xmlns="" w="9525">
+                <a14:hiddenLine xmlns="" xmlns:a14="http://schemas.microsoft.com/office/drawing/2010/main" w="9525">
                   <a:solidFill>
                     <a:srgbClr val="000000"/>
                   </a:solidFill>
@@ -3196,7 +3220,7 @@
             </a:ln>
             <a:extLst>
               <a:ext uri="{91240B29-F687-4f45-9708-019B960494DF}">
-                <a14:hiddenLine xmlns:a14="http://schemas.microsoft.com/office/drawing/2010/main" xmlns="" w="9525">
+                <a14:hiddenLine xmlns="" xmlns:a14="http://schemas.microsoft.com/office/drawing/2010/main" w="9525">
                   <a:solidFill>
                     <a:srgbClr val="000000"/>
                   </a:solidFill>
@@ -3230,7 +3254,7 @@
             </a:ln>
             <a:extLst>
               <a:ext uri="{91240B29-F687-4f45-9708-019B960494DF}">
-                <a14:hiddenLine xmlns:a14="http://schemas.microsoft.com/office/drawing/2010/main" xmlns="" w="9525">
+                <a14:hiddenLine xmlns="" xmlns:a14="http://schemas.microsoft.com/office/drawing/2010/main" w="9525">
                   <a:solidFill>
                     <a:srgbClr val="000000"/>
                   </a:solidFill>
@@ -3320,7 +3344,7 @@
             </a:ln>
             <a:extLst>
               <a:ext uri="{91240B29-F687-4f45-9708-019B960494DF}">
-                <a14:hiddenLine xmlns:a14="http://schemas.microsoft.com/office/drawing/2010/main" xmlns="" w="9525">
+                <a14:hiddenLine xmlns="" xmlns:a14="http://schemas.microsoft.com/office/drawing/2010/main" w="9525">
                   <a:solidFill>
                     <a:srgbClr val="000000"/>
                   </a:solidFill>
@@ -3382,7 +3406,7 @@
             </a:ln>
             <a:extLst>
               <a:ext uri="{91240B29-F687-4f45-9708-019B960494DF}">
-                <a14:hiddenLine xmlns:a14="http://schemas.microsoft.com/office/drawing/2010/main" xmlns="" w="9525">
+                <a14:hiddenLine xmlns="" xmlns:a14="http://schemas.microsoft.com/office/drawing/2010/main" w="9525">
                   <a:solidFill>
                     <a:srgbClr val="000000"/>
                   </a:solidFill>
@@ -3444,7 +3468,7 @@
             </a:ln>
             <a:extLst>
               <a:ext uri="{91240B29-F687-4f45-9708-019B960494DF}">
-                <a14:hiddenLine xmlns:a14="http://schemas.microsoft.com/office/drawing/2010/main" xmlns="" w="9525">
+                <a14:hiddenLine xmlns="" xmlns:a14="http://schemas.microsoft.com/office/drawing/2010/main" w="9525">
                   <a:solidFill>
                     <a:srgbClr val="000000"/>
                   </a:solidFill>
@@ -3534,7 +3558,7 @@
             </a:ln>
             <a:extLst>
               <a:ext uri="{91240B29-F687-4f45-9708-019B960494DF}">
-                <a14:hiddenLine xmlns:a14="http://schemas.microsoft.com/office/drawing/2010/main" xmlns="" w="9525">
+                <a14:hiddenLine xmlns="" xmlns:a14="http://schemas.microsoft.com/office/drawing/2010/main" w="9525">
                   <a:solidFill>
                     <a:srgbClr val="000000"/>
                   </a:solidFill>
@@ -3602,7 +3626,7 @@
             </a:ln>
             <a:extLst>
               <a:ext uri="{91240B29-F687-4f45-9708-019B960494DF}">
-                <a14:hiddenLine xmlns:a14="http://schemas.microsoft.com/office/drawing/2010/main" xmlns="" w="9525">
+                <a14:hiddenLine xmlns="" xmlns:a14="http://schemas.microsoft.com/office/drawing/2010/main" w="9525">
                   <a:solidFill>
                     <a:srgbClr val="000000"/>
                   </a:solidFill>
@@ -3664,7 +3688,7 @@
             </a:ln>
             <a:extLst>
               <a:ext uri="{91240B29-F687-4f45-9708-019B960494DF}">
-                <a14:hiddenLine xmlns:a14="http://schemas.microsoft.com/office/drawing/2010/main" xmlns="" w="9525">
+                <a14:hiddenLine xmlns="" xmlns:a14="http://schemas.microsoft.com/office/drawing/2010/main" w="9525">
                   <a:solidFill>
                     <a:srgbClr val="000000"/>
                   </a:solidFill>
@@ -3754,7 +3778,7 @@
             </a:ln>
             <a:extLst>
               <a:ext uri="{91240B29-F687-4f45-9708-019B960494DF}">
-                <a14:hiddenLine xmlns:a14="http://schemas.microsoft.com/office/drawing/2010/main" xmlns="" w="9525">
+                <a14:hiddenLine xmlns="" xmlns:a14="http://schemas.microsoft.com/office/drawing/2010/main" w="9525">
                   <a:solidFill>
                     <a:srgbClr val="000000"/>
                   </a:solidFill>
@@ -3816,7 +3840,7 @@
             </a:ln>
             <a:extLst>
               <a:ext uri="{91240B29-F687-4f45-9708-019B960494DF}">
-                <a14:hiddenLine xmlns:a14="http://schemas.microsoft.com/office/drawing/2010/main" xmlns="" w="9525">
+                <a14:hiddenLine xmlns="" xmlns:a14="http://schemas.microsoft.com/office/drawing/2010/main" w="9525">
                   <a:solidFill>
                     <a:srgbClr val="000000"/>
                   </a:solidFill>
@@ -3906,7 +3930,7 @@
             </a:ln>
             <a:extLst>
               <a:ext uri="{91240B29-F687-4f45-9708-019B960494DF}">
-                <a14:hiddenLine xmlns:a14="http://schemas.microsoft.com/office/drawing/2010/main" xmlns="" w="9525">
+                <a14:hiddenLine xmlns="" xmlns:a14="http://schemas.microsoft.com/office/drawing/2010/main" w="9525">
                   <a:solidFill>
                     <a:srgbClr val="000000"/>
                   </a:solidFill>
@@ -3968,7 +3992,7 @@
             </a:ln>
             <a:extLst>
               <a:ext uri="{91240B29-F687-4f45-9708-019B960494DF}">
-                <a14:hiddenLine xmlns:a14="http://schemas.microsoft.com/office/drawing/2010/main" xmlns="" w="9525">
+                <a14:hiddenLine xmlns="" xmlns:a14="http://schemas.microsoft.com/office/drawing/2010/main" w="9525">
                   <a:solidFill>
                     <a:srgbClr val="000000"/>
                   </a:solidFill>
@@ -4058,7 +4082,7 @@
             </a:ln>
             <a:extLst>
               <a:ext uri="{91240B29-F687-4f45-9708-019B960494DF}">
-                <a14:hiddenLine xmlns:a14="http://schemas.microsoft.com/office/drawing/2010/main" xmlns="" w="9525">
+                <a14:hiddenLine xmlns="" xmlns:a14="http://schemas.microsoft.com/office/drawing/2010/main" w="9525">
                   <a:solidFill>
                     <a:srgbClr val="000000"/>
                   </a:solidFill>
@@ -4092,7 +4116,7 @@
             </a:ln>
             <a:extLst>
               <a:ext uri="{91240B29-F687-4f45-9708-019B960494DF}">
-                <a14:hiddenLine xmlns:a14="http://schemas.microsoft.com/office/drawing/2010/main" xmlns="" w="9525">
+                <a14:hiddenLine xmlns="" xmlns:a14="http://schemas.microsoft.com/office/drawing/2010/main" w="9525">
                   <a:solidFill>
                     <a:srgbClr val="000000"/>
                   </a:solidFill>
@@ -4157,7 +4181,7 @@
             </a:ln>
             <a:extLst>
               <a:ext uri="{91240B29-F687-4f45-9708-019B960494DF}">
-                <a14:hiddenLine xmlns:a14="http://schemas.microsoft.com/office/drawing/2010/main" xmlns="" w="9525">
+                <a14:hiddenLine xmlns="" xmlns:a14="http://schemas.microsoft.com/office/drawing/2010/main" w="9525">
                   <a:solidFill>
                     <a:srgbClr val="000000"/>
                   </a:solidFill>
@@ -4247,7 +4271,7 @@
             </a:ln>
             <a:extLst>
               <a:ext uri="{91240B29-F687-4f45-9708-019B960494DF}">
-                <a14:hiddenLine xmlns:a14="http://schemas.microsoft.com/office/drawing/2010/main" xmlns="" w="9525">
+                <a14:hiddenLine xmlns="" xmlns:a14="http://schemas.microsoft.com/office/drawing/2010/main" w="9525">
                   <a:solidFill>
                     <a:srgbClr val="000000"/>
                   </a:solidFill>
@@ -4309,7 +4333,7 @@
             </a:ln>
             <a:extLst>
               <a:ext uri="{91240B29-F687-4f45-9708-019B960494DF}">
-                <a14:hiddenLine xmlns:a14="http://schemas.microsoft.com/office/drawing/2010/main" xmlns="" w="9525">
+                <a14:hiddenLine xmlns="" xmlns:a14="http://schemas.microsoft.com/office/drawing/2010/main" w="9525">
                   <a:solidFill>
                     <a:srgbClr val="000000"/>
                   </a:solidFill>
@@ -4399,7 +4423,7 @@
             </a:ln>
             <a:extLst>
               <a:ext uri="{91240B29-F687-4f45-9708-019B960494DF}">
-                <a14:hiddenLine xmlns:a14="http://schemas.microsoft.com/office/drawing/2010/main" xmlns="" w="9525">
+                <a14:hiddenLine xmlns="" xmlns:a14="http://schemas.microsoft.com/office/drawing/2010/main" w="9525">
                   <a:solidFill>
                     <a:srgbClr val="000000"/>
                   </a:solidFill>
@@ -4489,7 +4513,7 @@
             </a:ln>
             <a:extLst>
               <a:ext uri="{91240B29-F687-4f45-9708-019B960494DF}">
-                <a14:hiddenLine xmlns:a14="http://schemas.microsoft.com/office/drawing/2010/main" xmlns="" w="9525">
+                <a14:hiddenLine xmlns="" xmlns:a14="http://schemas.microsoft.com/office/drawing/2010/main" w="9525">
                   <a:solidFill>
                     <a:srgbClr val="000000"/>
                   </a:solidFill>
@@ -4554,7 +4578,7 @@
             </a:ln>
             <a:extLst>
               <a:ext uri="{91240B29-F687-4f45-9708-019B960494DF}">
-                <a14:hiddenLine xmlns:a14="http://schemas.microsoft.com/office/drawing/2010/main" xmlns="" w="9525">
+                <a14:hiddenLine xmlns="" xmlns:a14="http://schemas.microsoft.com/office/drawing/2010/main" w="9525">
                   <a:solidFill>
                     <a:srgbClr val="000000"/>
                   </a:solidFill>
@@ -4616,7 +4640,7 @@
             </a:ln>
             <a:extLst>
               <a:ext uri="{91240B29-F687-4f45-9708-019B960494DF}">
-                <a14:hiddenLine xmlns:a14="http://schemas.microsoft.com/office/drawing/2010/main" xmlns="" w="9525">
+                <a14:hiddenLine xmlns="" xmlns:a14="http://schemas.microsoft.com/office/drawing/2010/main" w="9525">
                   <a:solidFill>
                     <a:srgbClr val="000000"/>
                   </a:solidFill>
@@ -4706,7 +4730,7 @@
             </a:ln>
             <a:extLst>
               <a:ext uri="{91240B29-F687-4f45-9708-019B960494DF}">
-                <a14:hiddenLine xmlns:a14="http://schemas.microsoft.com/office/drawing/2010/main" xmlns="" w="9525">
+                <a14:hiddenLine xmlns="" xmlns:a14="http://schemas.microsoft.com/office/drawing/2010/main" w="9525">
                   <a:solidFill>
                     <a:srgbClr val="000000"/>
                   </a:solidFill>
@@ -4796,7 +4820,7 @@
             </a:ln>
             <a:extLst>
               <a:ext uri="{91240B29-F687-4f45-9708-019B960494DF}">
-                <a14:hiddenLine xmlns:a14="http://schemas.microsoft.com/office/drawing/2010/main" xmlns="" w="9525">
+                <a14:hiddenLine xmlns="" xmlns:a14="http://schemas.microsoft.com/office/drawing/2010/main" w="9525">
                   <a:solidFill>
                     <a:srgbClr val="000000"/>
                   </a:solidFill>
@@ -4858,7 +4882,7 @@
             </a:ln>
             <a:extLst>
               <a:ext uri="{91240B29-F687-4f45-9708-019B960494DF}">
-                <a14:hiddenLine xmlns:a14="http://schemas.microsoft.com/office/drawing/2010/main" xmlns="" w="9525">
+                <a14:hiddenLine xmlns="" xmlns:a14="http://schemas.microsoft.com/office/drawing/2010/main" w="9525">
                   <a:solidFill>
                     <a:srgbClr val="000000"/>
                   </a:solidFill>
@@ -4978,7 +5002,7 @@
             </a:ln>
             <a:extLst>
               <a:ext uri="{91240B29-F687-4f45-9708-019B960494DF}">
-                <a14:hiddenLine xmlns:a14="http://schemas.microsoft.com/office/drawing/2010/main" xmlns="" w="9525">
+                <a14:hiddenLine xmlns="" xmlns:a14="http://schemas.microsoft.com/office/drawing/2010/main" w="9525">
                   <a:solidFill>
                     <a:srgbClr val="000000"/>
                   </a:solidFill>
@@ -5046,7 +5070,7 @@
             </a:ln>
             <a:extLst>
               <a:ext uri="{91240B29-F687-4f45-9708-019B960494DF}">
-                <a14:hiddenLine xmlns:a14="http://schemas.microsoft.com/office/drawing/2010/main" xmlns="" w="9525">
+                <a14:hiddenLine xmlns="" xmlns:a14="http://schemas.microsoft.com/office/drawing/2010/main" w="9525">
                   <a:solidFill>
                     <a:srgbClr val="000000"/>
                   </a:solidFill>
@@ -5136,7 +5160,7 @@
             </a:ln>
             <a:extLst>
               <a:ext uri="{91240B29-F687-4f45-9708-019B960494DF}">
-                <a14:hiddenLine xmlns:a14="http://schemas.microsoft.com/office/drawing/2010/main" xmlns="" w="9525">
+                <a14:hiddenLine xmlns="" xmlns:a14="http://schemas.microsoft.com/office/drawing/2010/main" w="9525">
                   <a:solidFill>
                     <a:srgbClr val="000000"/>
                   </a:solidFill>
@@ -5276,7 +5300,7 @@
           <a:p>
             <a:fld id="{849DE176-146E-4F1E-BCCE-E46272DCA095}" type="datetimeFigureOut">
               <a:rPr lang="es-AR" smtClean="0"/>
-              <a:t>1/12/2023</a:t>
+              <a:t>20/4/2024</a:t>
             </a:fld>
             <a:endParaRPr lang="es-AR"/>
           </a:p>
@@ -5543,7 +5567,7 @@
           <a:p>
             <a:fld id="{849DE176-146E-4F1E-BCCE-E46272DCA095}" type="datetimeFigureOut">
               <a:rPr lang="es-AR" smtClean="0"/>
-              <a:t>1/12/2023</a:t>
+              <a:t>20/4/2024</a:t>
             </a:fld>
             <a:endParaRPr lang="es-AR"/>
           </a:p>
@@ -5739,7 +5763,7 @@
           <a:p>
             <a:fld id="{849DE176-146E-4F1E-BCCE-E46272DCA095}" type="datetimeFigureOut">
               <a:rPr lang="es-AR" smtClean="0"/>
-              <a:t>1/12/2023</a:t>
+              <a:t>20/4/2024</a:t>
             </a:fld>
             <a:endParaRPr lang="es-AR"/>
           </a:p>
@@ -6002,7 +6026,7 @@
           <a:p>
             <a:fld id="{849DE176-146E-4F1E-BCCE-E46272DCA095}" type="datetimeFigureOut">
               <a:rPr lang="es-AR" smtClean="0"/>
-              <a:t>1/12/2023</a:t>
+              <a:t>20/4/2024</a:t>
             </a:fld>
             <a:endParaRPr lang="es-AR"/>
           </a:p>
@@ -6436,7 +6460,7 @@
           <a:p>
             <a:fld id="{849DE176-146E-4F1E-BCCE-E46272DCA095}" type="datetimeFigureOut">
               <a:rPr lang="es-AR" smtClean="0"/>
-              <a:t>1/12/2023</a:t>
+              <a:t>20/4/2024</a:t>
             </a:fld>
             <a:endParaRPr lang="es-AR"/>
           </a:p>
@@ -6982,7 +7006,7 @@
           <a:p>
             <a:fld id="{849DE176-146E-4F1E-BCCE-E46272DCA095}" type="datetimeFigureOut">
               <a:rPr lang="es-AR" smtClean="0"/>
-              <a:t>1/12/2023</a:t>
+              <a:t>20/4/2024</a:t>
             </a:fld>
             <a:endParaRPr lang="es-AR"/>
           </a:p>
@@ -7702,7 +7726,7 @@
           <a:p>
             <a:fld id="{849DE176-146E-4F1E-BCCE-E46272DCA095}" type="datetimeFigureOut">
               <a:rPr lang="es-AR" smtClean="0"/>
-              <a:t>1/12/2023</a:t>
+              <a:t>20/4/2024</a:t>
             </a:fld>
             <a:endParaRPr lang="es-AR"/>
           </a:p>
@@ -7872,7 +7896,7 @@
           <a:p>
             <a:fld id="{849DE176-146E-4F1E-BCCE-E46272DCA095}" type="datetimeFigureOut">
               <a:rPr lang="es-AR" smtClean="0"/>
-              <a:t>1/12/2023</a:t>
+              <a:t>20/4/2024</a:t>
             </a:fld>
             <a:endParaRPr lang="es-AR"/>
           </a:p>
@@ -8052,7 +8076,7 @@
           <a:p>
             <a:fld id="{849DE176-146E-4F1E-BCCE-E46272DCA095}" type="datetimeFigureOut">
               <a:rPr lang="es-AR" smtClean="0"/>
-              <a:t>1/12/2023</a:t>
+              <a:t>20/4/2024</a:t>
             </a:fld>
             <a:endParaRPr lang="es-AR"/>
           </a:p>
@@ -8222,7 +8246,7 @@
           <a:p>
             <a:fld id="{849DE176-146E-4F1E-BCCE-E46272DCA095}" type="datetimeFigureOut">
               <a:rPr lang="es-AR" smtClean="0"/>
-              <a:t>1/12/2023</a:t>
+              <a:t>20/4/2024</a:t>
             </a:fld>
             <a:endParaRPr lang="es-AR"/>
           </a:p>
@@ -8472,7 +8496,7 @@
           <a:p>
             <a:fld id="{849DE176-146E-4F1E-BCCE-E46272DCA095}" type="datetimeFigureOut">
               <a:rPr lang="es-AR" smtClean="0"/>
-              <a:t>1/12/2023</a:t>
+              <a:t>20/4/2024</a:t>
             </a:fld>
             <a:endParaRPr lang="es-AR"/>
           </a:p>
@@ -8704,7 +8728,7 @@
           <a:p>
             <a:fld id="{849DE176-146E-4F1E-BCCE-E46272DCA095}" type="datetimeFigureOut">
               <a:rPr lang="es-AR" smtClean="0"/>
-              <a:t>1/12/2023</a:t>
+              <a:t>20/4/2024</a:t>
             </a:fld>
             <a:endParaRPr lang="es-AR"/>
           </a:p>
@@ -9085,7 +9109,7 @@
           <a:p>
             <a:fld id="{849DE176-146E-4F1E-BCCE-E46272DCA095}" type="datetimeFigureOut">
               <a:rPr lang="es-AR" smtClean="0"/>
-              <a:t>1/12/2023</a:t>
+              <a:t>20/4/2024</a:t>
             </a:fld>
             <a:endParaRPr lang="es-AR"/>
           </a:p>
@@ -9203,7 +9227,7 @@
           <a:p>
             <a:fld id="{849DE176-146E-4F1E-BCCE-E46272DCA095}" type="datetimeFigureOut">
               <a:rPr lang="es-AR" smtClean="0"/>
-              <a:t>1/12/2023</a:t>
+              <a:t>20/4/2024</a:t>
             </a:fld>
             <a:endParaRPr lang="es-AR"/>
           </a:p>
@@ -9298,7 +9322,7 @@
           <a:p>
             <a:fld id="{849DE176-146E-4F1E-BCCE-E46272DCA095}" type="datetimeFigureOut">
               <a:rPr lang="es-AR" smtClean="0"/>
-              <a:t>1/12/2023</a:t>
+              <a:t>20/4/2024</a:t>
             </a:fld>
             <a:endParaRPr lang="es-AR"/>
           </a:p>
@@ -9547,7 +9571,7 @@
           <a:p>
             <a:fld id="{849DE176-146E-4F1E-BCCE-E46272DCA095}" type="datetimeFigureOut">
               <a:rPr lang="es-AR" smtClean="0"/>
-              <a:t>1/12/2023</a:t>
+              <a:t>20/4/2024</a:t>
             </a:fld>
             <a:endParaRPr lang="es-AR"/>
           </a:p>
@@ -9827,7 +9851,7 @@
           <a:p>
             <a:fld id="{849DE176-146E-4F1E-BCCE-E46272DCA095}" type="datetimeFigureOut">
               <a:rPr lang="es-AR" smtClean="0"/>
-              <a:t>1/12/2023</a:t>
+              <a:t>20/4/2024</a:t>
             </a:fld>
             <a:endParaRPr lang="es-AR"/>
           </a:p>
@@ -9967,7 +9991,7 @@
           <a:noFill/>
           <a:extLst>
             <a:ext uri="{909E8E84-426E-40dd-AFC4-6F175D3DCCD1}">
-              <a14:hiddenFill xmlns:a14="http://schemas.microsoft.com/office/drawing/2010/main" xmlns="">
+              <a14:hiddenFill xmlns="" xmlns:a14="http://schemas.microsoft.com/office/drawing/2010/main">
                 <a:solidFill>
                   <a:srgbClr val="FFFFFF"/>
                 </a:solidFill>
@@ -10041,7 +10065,7 @@
               </a:ln>
               <a:extLst>
                 <a:ext uri="{91240B29-F687-4f45-9708-019B960494DF}">
-                  <a14:hiddenLine xmlns:a14="http://schemas.microsoft.com/office/drawing/2010/main" xmlns="" w="9525">
+                  <a14:hiddenLine xmlns="" xmlns:a14="http://schemas.microsoft.com/office/drawing/2010/main" w="9525">
                     <a:solidFill>
                       <a:srgbClr val="000000"/>
                     </a:solidFill>
@@ -10131,7 +10155,7 @@
               </a:ln>
               <a:extLst>
                 <a:ext uri="{91240B29-F687-4f45-9708-019B960494DF}">
-                  <a14:hiddenLine xmlns:a14="http://schemas.microsoft.com/office/drawing/2010/main" xmlns="" w="9525">
+                  <a14:hiddenLine xmlns="" xmlns:a14="http://schemas.microsoft.com/office/drawing/2010/main" w="9525">
                     <a:solidFill>
                       <a:srgbClr val="000000"/>
                     </a:solidFill>
@@ -10221,7 +10245,7 @@
               </a:ln>
               <a:extLst>
                 <a:ext uri="{91240B29-F687-4f45-9708-019B960494DF}">
-                  <a14:hiddenLine xmlns:a14="http://schemas.microsoft.com/office/drawing/2010/main" xmlns="" w="9525">
+                  <a14:hiddenLine xmlns="" xmlns:a14="http://schemas.microsoft.com/office/drawing/2010/main" w="9525">
                     <a:solidFill>
                       <a:srgbClr val="000000"/>
                     </a:solidFill>
@@ -10283,7 +10307,7 @@
               </a:ln>
               <a:extLst>
                 <a:ext uri="{91240B29-F687-4f45-9708-019B960494DF}">
-                  <a14:hiddenLine xmlns:a14="http://schemas.microsoft.com/office/drawing/2010/main" xmlns="" w="9525">
+                  <a14:hiddenLine xmlns="" xmlns:a14="http://schemas.microsoft.com/office/drawing/2010/main" w="9525">
                     <a:solidFill>
                       <a:srgbClr val="000000"/>
                     </a:solidFill>
@@ -10373,7 +10397,7 @@
               </a:ln>
               <a:extLst>
                 <a:ext uri="{91240B29-F687-4f45-9708-019B960494DF}">
-                  <a14:hiddenLine xmlns:a14="http://schemas.microsoft.com/office/drawing/2010/main" xmlns="" w="9525">
+                  <a14:hiddenLine xmlns="" xmlns:a14="http://schemas.microsoft.com/office/drawing/2010/main" w="9525">
                     <a:solidFill>
                       <a:srgbClr val="000000"/>
                     </a:solidFill>
@@ -10435,7 +10459,7 @@
               </a:ln>
               <a:extLst>
                 <a:ext uri="{91240B29-F687-4f45-9708-019B960494DF}">
-                  <a14:hiddenLine xmlns:a14="http://schemas.microsoft.com/office/drawing/2010/main" xmlns="" w="9525">
+                  <a14:hiddenLine xmlns="" xmlns:a14="http://schemas.microsoft.com/office/drawing/2010/main" w="9525">
                     <a:solidFill>
                       <a:srgbClr val="000000"/>
                     </a:solidFill>
@@ -10497,7 +10521,7 @@
               </a:ln>
               <a:extLst>
                 <a:ext uri="{91240B29-F687-4f45-9708-019B960494DF}">
-                  <a14:hiddenLine xmlns:a14="http://schemas.microsoft.com/office/drawing/2010/main" xmlns="" w="9525">
+                  <a14:hiddenLine xmlns="" xmlns:a14="http://schemas.microsoft.com/office/drawing/2010/main" w="9525">
                     <a:solidFill>
                       <a:srgbClr val="000000"/>
                     </a:solidFill>
@@ -10587,7 +10611,7 @@
               </a:ln>
               <a:extLst>
                 <a:ext uri="{91240B29-F687-4f45-9708-019B960494DF}">
-                  <a14:hiddenLine xmlns:a14="http://schemas.microsoft.com/office/drawing/2010/main" xmlns="" w="9525">
+                  <a14:hiddenLine xmlns="" xmlns:a14="http://schemas.microsoft.com/office/drawing/2010/main" w="9525">
                     <a:solidFill>
                       <a:srgbClr val="000000"/>
                     </a:solidFill>
@@ -10677,7 +10701,7 @@
               </a:ln>
               <a:extLst>
                 <a:ext uri="{91240B29-F687-4f45-9708-019B960494DF}">
-                  <a14:hiddenLine xmlns:a14="http://schemas.microsoft.com/office/drawing/2010/main" xmlns="" w="9525">
+                  <a14:hiddenLine xmlns="" xmlns:a14="http://schemas.microsoft.com/office/drawing/2010/main" w="9525">
                     <a:solidFill>
                       <a:srgbClr val="000000"/>
                     </a:solidFill>
@@ -10739,7 +10763,7 @@
               </a:ln>
               <a:extLst>
                 <a:ext uri="{91240B29-F687-4f45-9708-019B960494DF}">
-                  <a14:hiddenLine xmlns:a14="http://schemas.microsoft.com/office/drawing/2010/main" xmlns="" w="9525">
+                  <a14:hiddenLine xmlns="" xmlns:a14="http://schemas.microsoft.com/office/drawing/2010/main" w="9525">
                     <a:solidFill>
                       <a:srgbClr val="000000"/>
                     </a:solidFill>
@@ -10849,7 +10873,7 @@
               </a:ln>
               <a:extLst>
                 <a:ext uri="{91240B29-F687-4f45-9708-019B960494DF}">
-                  <a14:hiddenLine xmlns:a14="http://schemas.microsoft.com/office/drawing/2010/main" xmlns="" w="9525">
+                  <a14:hiddenLine xmlns="" xmlns:a14="http://schemas.microsoft.com/office/drawing/2010/main" w="9525">
                     <a:solidFill>
                       <a:srgbClr val="000000"/>
                     </a:solidFill>
@@ -10933,7 +10957,7 @@
               </a:ln>
               <a:extLst>
                 <a:ext uri="{91240B29-F687-4f45-9708-019B960494DF}">
-                  <a14:hiddenLine xmlns:a14="http://schemas.microsoft.com/office/drawing/2010/main" xmlns="" w="9525">
+                  <a14:hiddenLine xmlns="" xmlns:a14="http://schemas.microsoft.com/office/drawing/2010/main" w="9525">
                     <a:solidFill>
                       <a:srgbClr val="000000"/>
                     </a:solidFill>
@@ -10995,7 +11019,7 @@
               </a:ln>
               <a:extLst>
                 <a:ext uri="{91240B29-F687-4f45-9708-019B960494DF}">
-                  <a14:hiddenLine xmlns:a14="http://schemas.microsoft.com/office/drawing/2010/main" xmlns="" w="9525">
+                  <a14:hiddenLine xmlns="" xmlns:a14="http://schemas.microsoft.com/office/drawing/2010/main" w="9525">
                     <a:solidFill>
                       <a:srgbClr val="000000"/>
                     </a:solidFill>
@@ -11057,7 +11081,7 @@
               </a:ln>
               <a:extLst>
                 <a:ext uri="{91240B29-F687-4f45-9708-019B960494DF}">
-                  <a14:hiddenLine xmlns:a14="http://schemas.microsoft.com/office/drawing/2010/main" xmlns="" w="9525">
+                  <a14:hiddenLine xmlns="" xmlns:a14="http://schemas.microsoft.com/office/drawing/2010/main" w="9525">
                     <a:solidFill>
                       <a:srgbClr val="000000"/>
                     </a:solidFill>
@@ -11147,7 +11171,7 @@
               </a:ln>
               <a:extLst>
                 <a:ext uri="{91240B29-F687-4f45-9708-019B960494DF}">
-                  <a14:hiddenLine xmlns:a14="http://schemas.microsoft.com/office/drawing/2010/main" xmlns="" w="9525">
+                  <a14:hiddenLine xmlns="" xmlns:a14="http://schemas.microsoft.com/office/drawing/2010/main" w="9525">
                     <a:solidFill>
                       <a:srgbClr val="000000"/>
                     </a:solidFill>
@@ -11181,7 +11205,7 @@
               </a:ln>
               <a:extLst>
                 <a:ext uri="{91240B29-F687-4f45-9708-019B960494DF}">
-                  <a14:hiddenLine xmlns:a14="http://schemas.microsoft.com/office/drawing/2010/main" xmlns="" w="9525">
+                  <a14:hiddenLine xmlns="" xmlns:a14="http://schemas.microsoft.com/office/drawing/2010/main" w="9525">
                     <a:solidFill>
                       <a:srgbClr val="000000"/>
                     </a:solidFill>
@@ -11246,7 +11270,7 @@
               </a:ln>
               <a:extLst>
                 <a:ext uri="{91240B29-F687-4f45-9708-019B960494DF}">
-                  <a14:hiddenLine xmlns:a14="http://schemas.microsoft.com/office/drawing/2010/main" xmlns="" w="9525">
+                  <a14:hiddenLine xmlns="" xmlns:a14="http://schemas.microsoft.com/office/drawing/2010/main" w="9525">
                     <a:solidFill>
                       <a:srgbClr val="000000"/>
                     </a:solidFill>
@@ -11336,7 +11360,7 @@
               </a:ln>
               <a:extLst>
                 <a:ext uri="{91240B29-F687-4f45-9708-019B960494DF}">
-                  <a14:hiddenLine xmlns:a14="http://schemas.microsoft.com/office/drawing/2010/main" xmlns="" w="9525">
+                  <a14:hiddenLine xmlns="" xmlns:a14="http://schemas.microsoft.com/office/drawing/2010/main" w="9525">
                     <a:solidFill>
                       <a:srgbClr val="000000"/>
                     </a:solidFill>
@@ -11398,7 +11422,7 @@
               </a:ln>
               <a:extLst>
                 <a:ext uri="{91240B29-F687-4f45-9708-019B960494DF}">
-                  <a14:hiddenLine xmlns:a14="http://schemas.microsoft.com/office/drawing/2010/main" xmlns="" w="9525">
+                  <a14:hiddenLine xmlns="" xmlns:a14="http://schemas.microsoft.com/office/drawing/2010/main" w="9525">
                     <a:solidFill>
                       <a:srgbClr val="000000"/>
                     </a:solidFill>
@@ -11488,7 +11512,7 @@
               </a:ln>
               <a:extLst>
                 <a:ext uri="{91240B29-F687-4f45-9708-019B960494DF}">
-                  <a14:hiddenLine xmlns:a14="http://schemas.microsoft.com/office/drawing/2010/main" xmlns="" w="9525">
+                  <a14:hiddenLine xmlns="" xmlns:a14="http://schemas.microsoft.com/office/drawing/2010/main" w="9525">
                     <a:solidFill>
                       <a:srgbClr val="000000"/>
                     </a:solidFill>
@@ -11553,7 +11577,7 @@
               </a:ln>
               <a:extLst>
                 <a:ext uri="{91240B29-F687-4f45-9708-019B960494DF}">
-                  <a14:hiddenLine xmlns:a14="http://schemas.microsoft.com/office/drawing/2010/main" xmlns="" w="9525">
+                  <a14:hiddenLine xmlns="" xmlns:a14="http://schemas.microsoft.com/office/drawing/2010/main" w="9525">
                     <a:solidFill>
                       <a:srgbClr val="000000"/>
                     </a:solidFill>
@@ -11615,7 +11639,7 @@
               </a:ln>
               <a:extLst>
                 <a:ext uri="{91240B29-F687-4f45-9708-019B960494DF}">
-                  <a14:hiddenLine xmlns:a14="http://schemas.microsoft.com/office/drawing/2010/main" xmlns="" w="9525">
+                  <a14:hiddenLine xmlns="" xmlns:a14="http://schemas.microsoft.com/office/drawing/2010/main" w="9525">
                     <a:solidFill>
                       <a:srgbClr val="000000"/>
                     </a:solidFill>
@@ -11705,7 +11729,7 @@
               </a:ln>
               <a:extLst>
                 <a:ext uri="{91240B29-F687-4f45-9708-019B960494DF}">
-                  <a14:hiddenLine xmlns:a14="http://schemas.microsoft.com/office/drawing/2010/main" xmlns="" w="9525">
+                  <a14:hiddenLine xmlns="" xmlns:a14="http://schemas.microsoft.com/office/drawing/2010/main" w="9525">
                     <a:solidFill>
                       <a:srgbClr val="000000"/>
                     </a:solidFill>
@@ -11795,7 +11819,7 @@
               </a:ln>
               <a:extLst>
                 <a:ext uri="{91240B29-F687-4f45-9708-019B960494DF}">
-                  <a14:hiddenLine xmlns:a14="http://schemas.microsoft.com/office/drawing/2010/main" xmlns="" w="9525">
+                  <a14:hiddenLine xmlns="" xmlns:a14="http://schemas.microsoft.com/office/drawing/2010/main" w="9525">
                     <a:solidFill>
                       <a:srgbClr val="000000"/>
                     </a:solidFill>
@@ -11860,7 +11884,7 @@
               </a:ln>
               <a:extLst>
                 <a:ext uri="{91240B29-F687-4f45-9708-019B960494DF}">
-                  <a14:hiddenLine xmlns:a14="http://schemas.microsoft.com/office/drawing/2010/main" xmlns="" w="9525">
+                  <a14:hiddenLine xmlns="" xmlns:a14="http://schemas.microsoft.com/office/drawing/2010/main" w="9525">
                     <a:solidFill>
                       <a:srgbClr val="000000"/>
                     </a:solidFill>
@@ -11980,7 +12004,7 @@
               </a:ln>
               <a:extLst>
                 <a:ext uri="{91240B29-F687-4f45-9708-019B960494DF}">
-                  <a14:hiddenLine xmlns:a14="http://schemas.microsoft.com/office/drawing/2010/main" xmlns="" w="9525">
+                  <a14:hiddenLine xmlns="" xmlns:a14="http://schemas.microsoft.com/office/drawing/2010/main" w="9525">
                     <a:solidFill>
                       <a:srgbClr val="000000"/>
                     </a:solidFill>
@@ -12078,7 +12102,7 @@
               </a:ln>
               <a:extLst>
                 <a:ext uri="{91240B29-F687-4f45-9708-019B960494DF}">
-                  <a14:hiddenLine xmlns:a14="http://schemas.microsoft.com/office/drawing/2010/main" xmlns="" w="9525">
+                  <a14:hiddenLine xmlns="" xmlns:a14="http://schemas.microsoft.com/office/drawing/2010/main" w="9525">
                     <a:solidFill>
                       <a:srgbClr val="000000"/>
                     </a:solidFill>
@@ -12193,7 +12217,7 @@
               </a:ln>
               <a:extLst>
                 <a:ext uri="{91240B29-F687-4f45-9708-019B960494DF}">
-                  <a14:hiddenLine xmlns:a14="http://schemas.microsoft.com/office/drawing/2010/main" xmlns="" w="9525">
+                  <a14:hiddenLine xmlns="" xmlns:a14="http://schemas.microsoft.com/office/drawing/2010/main" w="9525">
                     <a:solidFill>
                       <a:srgbClr val="000000"/>
                     </a:solidFill>
@@ -12283,7 +12307,7 @@
               </a:ln>
               <a:extLst>
                 <a:ext uri="{91240B29-F687-4f45-9708-019B960494DF}">
-                  <a14:hiddenLine xmlns:a14="http://schemas.microsoft.com/office/drawing/2010/main" xmlns="" w="9525">
+                  <a14:hiddenLine xmlns="" xmlns:a14="http://schemas.microsoft.com/office/drawing/2010/main" w="9525">
                     <a:solidFill>
                       <a:srgbClr val="000000"/>
                     </a:solidFill>
@@ -12348,7 +12372,7 @@
               </a:ln>
               <a:extLst>
                 <a:ext uri="{91240B29-F687-4f45-9708-019B960494DF}">
-                  <a14:hiddenLine xmlns:a14="http://schemas.microsoft.com/office/drawing/2010/main" xmlns="" w="9525">
+                  <a14:hiddenLine xmlns="" xmlns:a14="http://schemas.microsoft.com/office/drawing/2010/main" w="9525">
                     <a:solidFill>
                       <a:srgbClr val="000000"/>
                     </a:solidFill>
@@ -12438,7 +12462,7 @@
               </a:ln>
               <a:extLst>
                 <a:ext uri="{91240B29-F687-4f45-9708-019B960494DF}">
-                  <a14:hiddenLine xmlns:a14="http://schemas.microsoft.com/office/drawing/2010/main" xmlns="" w="9525">
+                  <a14:hiddenLine xmlns="" xmlns:a14="http://schemas.microsoft.com/office/drawing/2010/main" w="9525">
                     <a:solidFill>
                       <a:srgbClr val="000000"/>
                     </a:solidFill>
@@ -12506,7 +12530,7 @@
               </a:ln>
               <a:extLst>
                 <a:ext uri="{91240B29-F687-4f45-9708-019B960494DF}">
-                  <a14:hiddenLine xmlns:a14="http://schemas.microsoft.com/office/drawing/2010/main" xmlns="" w="9525">
+                  <a14:hiddenLine xmlns="" xmlns:a14="http://schemas.microsoft.com/office/drawing/2010/main" w="9525">
                     <a:solidFill>
                       <a:srgbClr val="000000"/>
                     </a:solidFill>
@@ -12596,7 +12620,7 @@
               </a:ln>
               <a:extLst>
                 <a:ext uri="{91240B29-F687-4f45-9708-019B960494DF}">
-                  <a14:hiddenLine xmlns:a14="http://schemas.microsoft.com/office/drawing/2010/main" xmlns="" w="9525">
+                  <a14:hiddenLine xmlns="" xmlns:a14="http://schemas.microsoft.com/office/drawing/2010/main" w="9525">
                     <a:solidFill>
                       <a:srgbClr val="000000"/>
                     </a:solidFill>
@@ -12664,7 +12688,7 @@
               </a:ln>
               <a:extLst>
                 <a:ext uri="{91240B29-F687-4f45-9708-019B960494DF}">
-                  <a14:hiddenLine xmlns:a14="http://schemas.microsoft.com/office/drawing/2010/main" xmlns="" w="9525">
+                  <a14:hiddenLine xmlns="" xmlns:a14="http://schemas.microsoft.com/office/drawing/2010/main" w="9525">
                     <a:solidFill>
                       <a:srgbClr val="000000"/>
                     </a:solidFill>
@@ -12754,7 +12778,7 @@
               </a:ln>
               <a:extLst>
                 <a:ext uri="{91240B29-F687-4f45-9708-019B960494DF}">
-                  <a14:hiddenLine xmlns:a14="http://schemas.microsoft.com/office/drawing/2010/main" xmlns="" w="9525">
+                  <a14:hiddenLine xmlns="" xmlns:a14="http://schemas.microsoft.com/office/drawing/2010/main" w="9525">
                     <a:solidFill>
                       <a:srgbClr val="000000"/>
                     </a:solidFill>
@@ -12788,7 +12812,7 @@
               </a:ln>
               <a:extLst>
                 <a:ext uri="{91240B29-F687-4f45-9708-019B960494DF}">
-                  <a14:hiddenLine xmlns:a14="http://schemas.microsoft.com/office/drawing/2010/main" xmlns="" w="9525">
+                  <a14:hiddenLine xmlns="" xmlns:a14="http://schemas.microsoft.com/office/drawing/2010/main" w="9525">
                     <a:solidFill>
                       <a:srgbClr val="000000"/>
                     </a:solidFill>
@@ -12928,7 +12952,7 @@
           <a:p>
             <a:fld id="{849DE176-146E-4F1E-BCCE-E46272DCA095}" type="datetimeFigureOut">
               <a:rPr lang="es-AR" smtClean="0"/>
-              <a:t>1/12/2023</a:t>
+              <a:t>20/4/2024</a:t>
             </a:fld>
             <a:endParaRPr lang="es-AR"/>
           </a:p>
@@ -13639,204 +13663,6 @@
       </p:sp>
       <p:sp>
         <p:nvSpPr>
-          <p:cNvPr id="6" name="Subtitle 1"/>
-          <p:cNvSpPr txBox="1">
-            <a:spLocks/>
-          </p:cNvSpPr>
-          <p:nvPr/>
-        </p:nvSpPr>
-        <p:spPr>
-          <a:xfrm>
-            <a:off x="9696311" y="6357838"/>
-            <a:ext cx="2856659" cy="500162"/>
-          </a:xfrm>
-          <a:prstGeom prst="rect">
-            <a:avLst/>
-          </a:prstGeom>
-        </p:spPr>
-        <p:txBody>
-          <a:bodyPr vert="horz" lIns="91440" tIns="45720" rIns="91440" bIns="45720" rtlCol="0">
-            <a:noAutofit/>
-          </a:bodyPr>
-          <a:lstStyle>
-            <a:lvl1pPr marL="0" indent="0" algn="ctr" defTabSz="914400" rtl="0" eaLnBrk="1" latinLnBrk="0" hangingPunct="1">
-              <a:lnSpc>
-                <a:spcPct val="90000"/>
-              </a:lnSpc>
-              <a:spcBef>
-                <a:spcPts val="1000"/>
-              </a:spcBef>
-              <a:buFont typeface="Arial" panose="020B0604020202020204" pitchFamily="34" charset="0"/>
-              <a:buNone/>
-              <a:defRPr sz="2400" kern="1200">
-                <a:solidFill>
-                  <a:schemeClr val="tx1"/>
-                </a:solidFill>
-                <a:latin typeface="+mn-lt"/>
-                <a:ea typeface="+mn-ea"/>
-                <a:cs typeface="+mn-cs"/>
-              </a:defRPr>
-            </a:lvl1pPr>
-            <a:lvl2pPr marL="457200" indent="0" algn="ctr" defTabSz="914400" rtl="0" eaLnBrk="1" latinLnBrk="0" hangingPunct="1">
-              <a:lnSpc>
-                <a:spcPct val="90000"/>
-              </a:lnSpc>
-              <a:spcBef>
-                <a:spcPts val="500"/>
-              </a:spcBef>
-              <a:buFont typeface="Arial" panose="020B0604020202020204" pitchFamily="34" charset="0"/>
-              <a:buNone/>
-              <a:defRPr sz="2000" kern="1200">
-                <a:solidFill>
-                  <a:schemeClr val="tx1"/>
-                </a:solidFill>
-                <a:latin typeface="+mn-lt"/>
-                <a:ea typeface="+mn-ea"/>
-                <a:cs typeface="+mn-cs"/>
-              </a:defRPr>
-            </a:lvl2pPr>
-            <a:lvl3pPr marL="914400" indent="0" algn="ctr" defTabSz="914400" rtl="0" eaLnBrk="1" latinLnBrk="0" hangingPunct="1">
-              <a:lnSpc>
-                <a:spcPct val="90000"/>
-              </a:lnSpc>
-              <a:spcBef>
-                <a:spcPts val="500"/>
-              </a:spcBef>
-              <a:buFont typeface="Arial" panose="020B0604020202020204" pitchFamily="34" charset="0"/>
-              <a:buNone/>
-              <a:defRPr sz="1800" kern="1200">
-                <a:solidFill>
-                  <a:schemeClr val="tx1"/>
-                </a:solidFill>
-                <a:latin typeface="+mn-lt"/>
-                <a:ea typeface="+mn-ea"/>
-                <a:cs typeface="+mn-cs"/>
-              </a:defRPr>
-            </a:lvl3pPr>
-            <a:lvl4pPr marL="1371600" indent="0" algn="ctr" defTabSz="914400" rtl="0" eaLnBrk="1" latinLnBrk="0" hangingPunct="1">
-              <a:lnSpc>
-                <a:spcPct val="90000"/>
-              </a:lnSpc>
-              <a:spcBef>
-                <a:spcPts val="500"/>
-              </a:spcBef>
-              <a:buFont typeface="Arial" panose="020B0604020202020204" pitchFamily="34" charset="0"/>
-              <a:buNone/>
-              <a:defRPr sz="1600" kern="1200">
-                <a:solidFill>
-                  <a:schemeClr val="tx1"/>
-                </a:solidFill>
-                <a:latin typeface="+mn-lt"/>
-                <a:ea typeface="+mn-ea"/>
-                <a:cs typeface="+mn-cs"/>
-              </a:defRPr>
-            </a:lvl4pPr>
-            <a:lvl5pPr marL="1828800" indent="0" algn="ctr" defTabSz="914400" rtl="0" eaLnBrk="1" latinLnBrk="0" hangingPunct="1">
-              <a:lnSpc>
-                <a:spcPct val="90000"/>
-              </a:lnSpc>
-              <a:spcBef>
-                <a:spcPts val="500"/>
-              </a:spcBef>
-              <a:buFont typeface="Arial" panose="020B0604020202020204" pitchFamily="34" charset="0"/>
-              <a:buNone/>
-              <a:defRPr sz="1600" kern="1200">
-                <a:solidFill>
-                  <a:schemeClr val="tx1"/>
-                </a:solidFill>
-                <a:latin typeface="+mn-lt"/>
-                <a:ea typeface="+mn-ea"/>
-                <a:cs typeface="+mn-cs"/>
-              </a:defRPr>
-            </a:lvl5pPr>
-            <a:lvl6pPr marL="2286000" indent="0" algn="ctr" defTabSz="914400" rtl="0" eaLnBrk="1" latinLnBrk="0" hangingPunct="1">
-              <a:lnSpc>
-                <a:spcPct val="90000"/>
-              </a:lnSpc>
-              <a:spcBef>
-                <a:spcPts val="500"/>
-              </a:spcBef>
-              <a:buFont typeface="Arial" panose="020B0604020202020204" pitchFamily="34" charset="0"/>
-              <a:buNone/>
-              <a:defRPr sz="1600" kern="1200">
-                <a:solidFill>
-                  <a:schemeClr val="tx1"/>
-                </a:solidFill>
-                <a:latin typeface="+mn-lt"/>
-                <a:ea typeface="+mn-ea"/>
-                <a:cs typeface="+mn-cs"/>
-              </a:defRPr>
-            </a:lvl6pPr>
-            <a:lvl7pPr marL="2743200" indent="0" algn="ctr" defTabSz="914400" rtl="0" eaLnBrk="1" latinLnBrk="0" hangingPunct="1">
-              <a:lnSpc>
-                <a:spcPct val="90000"/>
-              </a:lnSpc>
-              <a:spcBef>
-                <a:spcPts val="500"/>
-              </a:spcBef>
-              <a:buFont typeface="Arial" panose="020B0604020202020204" pitchFamily="34" charset="0"/>
-              <a:buNone/>
-              <a:defRPr sz="1600" kern="1200">
-                <a:solidFill>
-                  <a:schemeClr val="tx1"/>
-                </a:solidFill>
-                <a:latin typeface="+mn-lt"/>
-                <a:ea typeface="+mn-ea"/>
-                <a:cs typeface="+mn-cs"/>
-              </a:defRPr>
-            </a:lvl7pPr>
-            <a:lvl8pPr marL="3200400" indent="0" algn="ctr" defTabSz="914400" rtl="0" eaLnBrk="1" latinLnBrk="0" hangingPunct="1">
-              <a:lnSpc>
-                <a:spcPct val="90000"/>
-              </a:lnSpc>
-              <a:spcBef>
-                <a:spcPts val="500"/>
-              </a:spcBef>
-              <a:buFont typeface="Arial" panose="020B0604020202020204" pitchFamily="34" charset="0"/>
-              <a:buNone/>
-              <a:defRPr sz="1600" kern="1200">
-                <a:solidFill>
-                  <a:schemeClr val="tx1"/>
-                </a:solidFill>
-                <a:latin typeface="+mn-lt"/>
-                <a:ea typeface="+mn-ea"/>
-                <a:cs typeface="+mn-cs"/>
-              </a:defRPr>
-            </a:lvl8pPr>
-            <a:lvl9pPr marL="3657600" indent="0" algn="ctr" defTabSz="914400" rtl="0" eaLnBrk="1" latinLnBrk="0" hangingPunct="1">
-              <a:lnSpc>
-                <a:spcPct val="90000"/>
-              </a:lnSpc>
-              <a:spcBef>
-                <a:spcPts val="500"/>
-              </a:spcBef>
-              <a:buFont typeface="Arial" panose="020B0604020202020204" pitchFamily="34" charset="0"/>
-              <a:buNone/>
-              <a:defRPr sz="1600" kern="1200">
-                <a:solidFill>
-                  <a:schemeClr val="tx1"/>
-                </a:solidFill>
-                <a:latin typeface="+mn-lt"/>
-                <a:ea typeface="+mn-ea"/>
-                <a:cs typeface="+mn-cs"/>
-              </a:defRPr>
-            </a:lvl9pPr>
-          </a:lstStyle>
-          <a:p>
-            <a:pPr algn="l"/>
-            <a:r>
-              <a:rPr lang="es-AR" dirty="0">
-                <a:solidFill>
-                  <a:schemeClr val="bg1"/>
-                </a:solidFill>
-              </a:rPr>
-              <a:t>Abril 2023</a:t>
-            </a:r>
-          </a:p>
-        </p:txBody>
-      </p:sp>
-      <p:sp>
-        <p:nvSpPr>
           <p:cNvPr id="8" name="Subtitle 1"/>
           <p:cNvSpPr txBox="1">
             <a:spLocks/>

</xml_diff>